<commit_message>
Updated horvath.pptx, added horvath.ppsx
</commit_message>
<xml_diff>
--- a/horvath.pptx
+++ b/horvath.pptx
@@ -130,18 +130,230 @@
 <file path=ppt/revisionInfo.xml><?xml version="1.0" encoding="utf-8"?>
 <p1510:revInfo xmlns:a="http://schemas.openxmlformats.org/drawingml/2006/main" xmlns:r="http://schemas.openxmlformats.org/officeDocument/2006/relationships" xmlns:p1510="http://schemas.microsoft.com/office/powerpoint/2015/10/main">
   <p1510:revLst>
-    <p1510:client id="{17B054D8-A26A-7BDB-B608-4F995BF67F96}" v="338" dt="2023-01-16T18:49:49.910"/>
-    <p1510:client id="{2F94DA43-D29A-2044-91F7-EA64A333DABB}" v="545" dt="2023-01-17T18:04:10.394"/>
-    <p1510:client id="{3D9595F1-8E06-0E87-1AE6-B83E193FAD22}" v="130" dt="2023-01-09T18:03:36.874"/>
-    <p1510:client id="{45398B61-7F1E-237B-5C24-23A682D5EC68}" v="130" dt="2023-01-14T15:52:06.716"/>
-    <p1510:client id="{84ABAEFF-358B-2271-21FD-9D812A704519}" v="138" dt="2023-01-08T10:22:40.827"/>
-    <p1510:client id="{9DDDA8D4-C02F-BC48-4098-4D6B21335B58}" v="182" dt="2023-01-11T19:16:33.597"/>
-    <p1510:client id="{DD3E86D0-9318-CBE5-C52E-355F512D6693}" v="182" dt="2023-01-14T16:23:46.553"/>
-    <p1510:client id="{DE90C6F3-66A9-BDF8-193E-E91FDD634819}" v="1" dt="2023-01-08T10:23:44.808"/>
-    <p1510:client id="{E05190BB-AD6A-DC0F-C6E3-D96BA3F8E8A9}" v="1" dt="2023-01-14T15:52:54.405"/>
-    <p1510:client id="{FFE463EC-2E29-561E-B07C-75661D4B65A7}" v="445" dt="2023-01-09T17:50:49.036"/>
+    <p1510:client id="{BD17A7A3-1D0F-4647-8DCE-E7FD05DAE448}" v="19" dt="2023-01-19T18:15:45.030"/>
   </p1510:revLst>
 </p1510:revInfo>
+</file>
+
+<file path=ppt/changesInfos/changesInfo1.xml><?xml version="1.0" encoding="utf-8"?>
+<pc:chgInfo xmlns:a="http://schemas.openxmlformats.org/drawingml/2006/main" xmlns:r="http://schemas.openxmlformats.org/officeDocument/2006/relationships" xmlns:ac="http://schemas.microsoft.com/office/drawing/2013/main/command" xmlns:pc="http://schemas.microsoft.com/office/powerpoint/2013/main/command">
+  <pc:docChgLst>
+    <pc:chgData name="Michal Horvath" userId="a78b95b046f4b743" providerId="LiveId" clId="{BD17A7A3-1D0F-4647-8DCE-E7FD05DAE448}"/>
+    <pc:docChg chg="modSld modMainMaster">
+      <pc:chgData name="Michal Horvath" userId="a78b95b046f4b743" providerId="LiveId" clId="{BD17A7A3-1D0F-4647-8DCE-E7FD05DAE448}" dt="2023-01-19T18:15:45.030" v="18"/>
+      <pc:docMkLst>
+        <pc:docMk/>
+      </pc:docMkLst>
+      <pc:sldChg chg="modTransition">
+        <pc:chgData name="Michal Horvath" userId="a78b95b046f4b743" providerId="LiveId" clId="{BD17A7A3-1D0F-4647-8DCE-E7FD05DAE448}" dt="2023-01-19T18:15:29.238" v="15"/>
+        <pc:sldMkLst>
+          <pc:docMk/>
+          <pc:sldMk cId="3799523001" sldId="256"/>
+        </pc:sldMkLst>
+      </pc:sldChg>
+      <pc:sldChg chg="modTransition">
+        <pc:chgData name="Michal Horvath" userId="a78b95b046f4b743" providerId="LiveId" clId="{BD17A7A3-1D0F-4647-8DCE-E7FD05DAE448}" dt="2023-01-19T18:15:38.734" v="17"/>
+        <pc:sldMkLst>
+          <pc:docMk/>
+          <pc:sldMk cId="2811926269" sldId="258"/>
+        </pc:sldMkLst>
+      </pc:sldChg>
+      <pc:sldChg chg="modTransition">
+        <pc:chgData name="Michal Horvath" userId="a78b95b046f4b743" providerId="LiveId" clId="{BD17A7A3-1D0F-4647-8DCE-E7FD05DAE448}" dt="2023-01-19T18:15:24.326" v="14"/>
+        <pc:sldMkLst>
+          <pc:docMk/>
+          <pc:sldMk cId="2494908260" sldId="259"/>
+        </pc:sldMkLst>
+      </pc:sldChg>
+      <pc:sldChg chg="modTransition">
+        <pc:chgData name="Michal Horvath" userId="a78b95b046f4b743" providerId="LiveId" clId="{BD17A7A3-1D0F-4647-8DCE-E7FD05DAE448}" dt="2023-01-19T18:15:32.582" v="16"/>
+        <pc:sldMkLst>
+          <pc:docMk/>
+          <pc:sldMk cId="2682461447" sldId="260"/>
+        </pc:sldMkLst>
+      </pc:sldChg>
+      <pc:sldChg chg="modTransition">
+        <pc:chgData name="Michal Horvath" userId="a78b95b046f4b743" providerId="LiveId" clId="{BD17A7A3-1D0F-4647-8DCE-E7FD05DAE448}" dt="2023-01-19T18:15:24.326" v="14"/>
+        <pc:sldMkLst>
+          <pc:docMk/>
+          <pc:sldMk cId="1805287342" sldId="261"/>
+        </pc:sldMkLst>
+      </pc:sldChg>
+      <pc:sldChg chg="modTransition">
+        <pc:chgData name="Michal Horvath" userId="a78b95b046f4b743" providerId="LiveId" clId="{BD17A7A3-1D0F-4647-8DCE-E7FD05DAE448}" dt="2023-01-19T18:15:24.326" v="14"/>
+        <pc:sldMkLst>
+          <pc:docMk/>
+          <pc:sldMk cId="3392201423" sldId="262"/>
+        </pc:sldMkLst>
+      </pc:sldChg>
+      <pc:sldChg chg="modTransition">
+        <pc:chgData name="Michal Horvath" userId="a78b95b046f4b743" providerId="LiveId" clId="{BD17A7A3-1D0F-4647-8DCE-E7FD05DAE448}" dt="2023-01-19T18:15:24.326" v="14"/>
+        <pc:sldMkLst>
+          <pc:docMk/>
+          <pc:sldMk cId="3518947364" sldId="263"/>
+        </pc:sldMkLst>
+      </pc:sldChg>
+      <pc:sldChg chg="modTransition">
+        <pc:chgData name="Michal Horvath" userId="a78b95b046f4b743" providerId="LiveId" clId="{BD17A7A3-1D0F-4647-8DCE-E7FD05DAE448}" dt="2023-01-19T18:15:24.326" v="14"/>
+        <pc:sldMkLst>
+          <pc:docMk/>
+          <pc:sldMk cId="25997105" sldId="264"/>
+        </pc:sldMkLst>
+      </pc:sldChg>
+      <pc:sldChg chg="modTransition">
+        <pc:chgData name="Michal Horvath" userId="a78b95b046f4b743" providerId="LiveId" clId="{BD17A7A3-1D0F-4647-8DCE-E7FD05DAE448}" dt="2023-01-19T18:15:45.030" v="18"/>
+        <pc:sldMkLst>
+          <pc:docMk/>
+          <pc:sldMk cId="1668892830" sldId="265"/>
+        </pc:sldMkLst>
+      </pc:sldChg>
+      <pc:sldChg chg="modTransition">
+        <pc:chgData name="Michal Horvath" userId="a78b95b046f4b743" providerId="LiveId" clId="{BD17A7A3-1D0F-4647-8DCE-E7FD05DAE448}" dt="2023-01-19T18:15:24.326" v="14"/>
+        <pc:sldMkLst>
+          <pc:docMk/>
+          <pc:sldMk cId="992021739" sldId="266"/>
+        </pc:sldMkLst>
+      </pc:sldChg>
+      <pc:sldChg chg="modTransition">
+        <pc:chgData name="Michal Horvath" userId="a78b95b046f4b743" providerId="LiveId" clId="{BD17A7A3-1D0F-4647-8DCE-E7FD05DAE448}" dt="2023-01-19T18:15:24.326" v="14"/>
+        <pc:sldMkLst>
+          <pc:docMk/>
+          <pc:sldMk cId="2343270399" sldId="267"/>
+        </pc:sldMkLst>
+      </pc:sldChg>
+      <pc:sldChg chg="modTransition">
+        <pc:chgData name="Michal Horvath" userId="a78b95b046f4b743" providerId="LiveId" clId="{BD17A7A3-1D0F-4647-8DCE-E7FD05DAE448}" dt="2023-01-19T18:15:24.326" v="14"/>
+        <pc:sldMkLst>
+          <pc:docMk/>
+          <pc:sldMk cId="2089750412" sldId="268"/>
+        </pc:sldMkLst>
+      </pc:sldChg>
+      <pc:sldChg chg="modTransition">
+        <pc:chgData name="Michal Horvath" userId="a78b95b046f4b743" providerId="LiveId" clId="{BD17A7A3-1D0F-4647-8DCE-E7FD05DAE448}" dt="2023-01-19T18:15:24.326" v="14"/>
+        <pc:sldMkLst>
+          <pc:docMk/>
+          <pc:sldMk cId="574112604" sldId="269"/>
+        </pc:sldMkLst>
+      </pc:sldChg>
+      <pc:sldChg chg="modTransition">
+        <pc:chgData name="Michal Horvath" userId="a78b95b046f4b743" providerId="LiveId" clId="{BD17A7A3-1D0F-4647-8DCE-E7FD05DAE448}" dt="2023-01-19T18:15:24.326" v="14"/>
+        <pc:sldMkLst>
+          <pc:docMk/>
+          <pc:sldMk cId="3902934988" sldId="270"/>
+        </pc:sldMkLst>
+      </pc:sldChg>
+      <pc:sldChg chg="modTransition">
+        <pc:chgData name="Michal Horvath" userId="a78b95b046f4b743" providerId="LiveId" clId="{BD17A7A3-1D0F-4647-8DCE-E7FD05DAE448}" dt="2023-01-19T18:15:24.326" v="14"/>
+        <pc:sldMkLst>
+          <pc:docMk/>
+          <pc:sldMk cId="1781476271" sldId="271"/>
+        </pc:sldMkLst>
+      </pc:sldChg>
+      <pc:sldChg chg="modTransition">
+        <pc:chgData name="Michal Horvath" userId="a78b95b046f4b743" providerId="LiveId" clId="{BD17A7A3-1D0F-4647-8DCE-E7FD05DAE448}" dt="2023-01-19T18:15:24.326" v="14"/>
+        <pc:sldMkLst>
+          <pc:docMk/>
+          <pc:sldMk cId="988768958" sldId="272"/>
+        </pc:sldMkLst>
+      </pc:sldChg>
+      <pc:sldMasterChg chg="modTransition modSldLayout">
+        <pc:chgData name="Michal Horvath" userId="a78b95b046f4b743" providerId="LiveId" clId="{BD17A7A3-1D0F-4647-8DCE-E7FD05DAE448}" dt="2023-01-19T18:15:24.326" v="14"/>
+        <pc:sldMasterMkLst>
+          <pc:docMk/>
+          <pc:sldMasterMk cId="464252367" sldId="2147483648"/>
+        </pc:sldMasterMkLst>
+        <pc:sldLayoutChg chg="modTransition">
+          <pc:chgData name="Michal Horvath" userId="a78b95b046f4b743" providerId="LiveId" clId="{BD17A7A3-1D0F-4647-8DCE-E7FD05DAE448}" dt="2023-01-19T18:15:24.326" v="14"/>
+          <pc:sldLayoutMkLst>
+            <pc:docMk/>
+            <pc:sldMasterMk cId="464252367" sldId="2147483648"/>
+            <pc:sldLayoutMk cId="1771309689" sldId="2147483649"/>
+          </pc:sldLayoutMkLst>
+        </pc:sldLayoutChg>
+        <pc:sldLayoutChg chg="modTransition">
+          <pc:chgData name="Michal Horvath" userId="a78b95b046f4b743" providerId="LiveId" clId="{BD17A7A3-1D0F-4647-8DCE-E7FD05DAE448}" dt="2023-01-19T18:15:24.326" v="14"/>
+          <pc:sldLayoutMkLst>
+            <pc:docMk/>
+            <pc:sldMasterMk cId="464252367" sldId="2147483648"/>
+            <pc:sldLayoutMk cId="21655345" sldId="2147483650"/>
+          </pc:sldLayoutMkLst>
+        </pc:sldLayoutChg>
+        <pc:sldLayoutChg chg="modTransition">
+          <pc:chgData name="Michal Horvath" userId="a78b95b046f4b743" providerId="LiveId" clId="{BD17A7A3-1D0F-4647-8DCE-E7FD05DAE448}" dt="2023-01-19T18:15:24.326" v="14"/>
+          <pc:sldLayoutMkLst>
+            <pc:docMk/>
+            <pc:sldMasterMk cId="464252367" sldId="2147483648"/>
+            <pc:sldLayoutMk cId="2957285559" sldId="2147483651"/>
+          </pc:sldLayoutMkLst>
+        </pc:sldLayoutChg>
+        <pc:sldLayoutChg chg="modTransition">
+          <pc:chgData name="Michal Horvath" userId="a78b95b046f4b743" providerId="LiveId" clId="{BD17A7A3-1D0F-4647-8DCE-E7FD05DAE448}" dt="2023-01-19T18:15:24.326" v="14"/>
+          <pc:sldLayoutMkLst>
+            <pc:docMk/>
+            <pc:sldMasterMk cId="464252367" sldId="2147483648"/>
+            <pc:sldLayoutMk cId="3426106184" sldId="2147483652"/>
+          </pc:sldLayoutMkLst>
+        </pc:sldLayoutChg>
+        <pc:sldLayoutChg chg="modTransition">
+          <pc:chgData name="Michal Horvath" userId="a78b95b046f4b743" providerId="LiveId" clId="{BD17A7A3-1D0F-4647-8DCE-E7FD05DAE448}" dt="2023-01-19T18:15:24.326" v="14"/>
+          <pc:sldLayoutMkLst>
+            <pc:docMk/>
+            <pc:sldMasterMk cId="464252367" sldId="2147483648"/>
+            <pc:sldLayoutMk cId="597578085" sldId="2147483653"/>
+          </pc:sldLayoutMkLst>
+        </pc:sldLayoutChg>
+        <pc:sldLayoutChg chg="modTransition">
+          <pc:chgData name="Michal Horvath" userId="a78b95b046f4b743" providerId="LiveId" clId="{BD17A7A3-1D0F-4647-8DCE-E7FD05DAE448}" dt="2023-01-19T18:15:24.326" v="14"/>
+          <pc:sldLayoutMkLst>
+            <pc:docMk/>
+            <pc:sldMasterMk cId="464252367" sldId="2147483648"/>
+            <pc:sldLayoutMk cId="3514983867" sldId="2147483654"/>
+          </pc:sldLayoutMkLst>
+        </pc:sldLayoutChg>
+        <pc:sldLayoutChg chg="modTransition">
+          <pc:chgData name="Michal Horvath" userId="a78b95b046f4b743" providerId="LiveId" clId="{BD17A7A3-1D0F-4647-8DCE-E7FD05DAE448}" dt="2023-01-19T18:15:24.326" v="14"/>
+          <pc:sldLayoutMkLst>
+            <pc:docMk/>
+            <pc:sldMasterMk cId="464252367" sldId="2147483648"/>
+            <pc:sldLayoutMk cId="2973794414" sldId="2147483655"/>
+          </pc:sldLayoutMkLst>
+        </pc:sldLayoutChg>
+        <pc:sldLayoutChg chg="modTransition">
+          <pc:chgData name="Michal Horvath" userId="a78b95b046f4b743" providerId="LiveId" clId="{BD17A7A3-1D0F-4647-8DCE-E7FD05DAE448}" dt="2023-01-19T18:15:24.326" v="14"/>
+          <pc:sldLayoutMkLst>
+            <pc:docMk/>
+            <pc:sldMasterMk cId="464252367" sldId="2147483648"/>
+            <pc:sldLayoutMk cId="3504307544" sldId="2147483656"/>
+          </pc:sldLayoutMkLst>
+        </pc:sldLayoutChg>
+        <pc:sldLayoutChg chg="modTransition">
+          <pc:chgData name="Michal Horvath" userId="a78b95b046f4b743" providerId="LiveId" clId="{BD17A7A3-1D0F-4647-8DCE-E7FD05DAE448}" dt="2023-01-19T18:15:24.326" v="14"/>
+          <pc:sldLayoutMkLst>
+            <pc:docMk/>
+            <pc:sldMasterMk cId="464252367" sldId="2147483648"/>
+            <pc:sldLayoutMk cId="4088594436" sldId="2147483657"/>
+          </pc:sldLayoutMkLst>
+        </pc:sldLayoutChg>
+        <pc:sldLayoutChg chg="modTransition">
+          <pc:chgData name="Michal Horvath" userId="a78b95b046f4b743" providerId="LiveId" clId="{BD17A7A3-1D0F-4647-8DCE-E7FD05DAE448}" dt="2023-01-19T18:15:24.326" v="14"/>
+          <pc:sldLayoutMkLst>
+            <pc:docMk/>
+            <pc:sldMasterMk cId="464252367" sldId="2147483648"/>
+            <pc:sldLayoutMk cId="707188527" sldId="2147483658"/>
+          </pc:sldLayoutMkLst>
+        </pc:sldLayoutChg>
+        <pc:sldLayoutChg chg="modTransition">
+          <pc:chgData name="Michal Horvath" userId="a78b95b046f4b743" providerId="LiveId" clId="{BD17A7A3-1D0F-4647-8DCE-E7FD05DAE448}" dt="2023-01-19T18:15:24.326" v="14"/>
+          <pc:sldLayoutMkLst>
+            <pc:docMk/>
+            <pc:sldMasterMk cId="464252367" sldId="2147483648"/>
+            <pc:sldLayoutMk cId="1955787437" sldId="2147483659"/>
+          </pc:sldLayoutMkLst>
+        </pc:sldLayoutChg>
+      </pc:sldMasterChg>
+    </pc:docChg>
+  </pc:docChgLst>
+</pc:chgInfo>
 </file>
 
 <file path=ppt/slideLayouts/slideLayout1.xml><?xml version="1.0" encoding="utf-8"?>
@@ -273,7 +485,7 @@
           <a:p>
             <a:fld id="{8A3A43DF-04A3-4662-88CA-28FDED1CFC09}" type="datetimeFigureOut">
               <a:rPr lang="cs-CZ" smtClean="0"/>
-              <a:t>17.01.2023</a:t>
+              <a:t>19.01.2023</a:t>
             </a:fld>
             <a:endParaRPr lang="cs-CZ"/>
           </a:p>
@@ -331,6 +543,9 @@
   <p:clrMapOvr>
     <a:masterClrMapping/>
   </p:clrMapOvr>
+  <p:transition spd="slow" advTm="90000">
+    <p:push dir="u"/>
+  </p:transition>
 </p:sldLayout>
 </file>
 
@@ -441,7 +656,7 @@
           <a:p>
             <a:fld id="{8A3A43DF-04A3-4662-88CA-28FDED1CFC09}" type="datetimeFigureOut">
               <a:rPr lang="cs-CZ" smtClean="0"/>
-              <a:t>17.01.2023</a:t>
+              <a:t>19.01.2023</a:t>
             </a:fld>
             <a:endParaRPr lang="cs-CZ"/>
           </a:p>
@@ -499,6 +714,9 @@
   <p:clrMapOvr>
     <a:masterClrMapping/>
   </p:clrMapOvr>
+  <p:transition spd="slow" advTm="90000">
+    <p:push dir="u"/>
+  </p:transition>
 </p:sldLayout>
 </file>
 
@@ -619,7 +837,7 @@
           <a:p>
             <a:fld id="{8A3A43DF-04A3-4662-88CA-28FDED1CFC09}" type="datetimeFigureOut">
               <a:rPr lang="cs-CZ" smtClean="0"/>
-              <a:t>17.01.2023</a:t>
+              <a:t>19.01.2023</a:t>
             </a:fld>
             <a:endParaRPr lang="cs-CZ"/>
           </a:p>
@@ -677,6 +895,9 @@
   <p:clrMapOvr>
     <a:masterClrMapping/>
   </p:clrMapOvr>
+  <p:transition spd="slow" advTm="90000">
+    <p:push dir="u"/>
+  </p:transition>
 </p:sldLayout>
 </file>
 
@@ -787,7 +1008,7 @@
           <a:p>
             <a:fld id="{8A3A43DF-04A3-4662-88CA-28FDED1CFC09}" type="datetimeFigureOut">
               <a:rPr lang="cs-CZ" smtClean="0"/>
-              <a:t>17.01.2023</a:t>
+              <a:t>19.01.2023</a:t>
             </a:fld>
             <a:endParaRPr lang="cs-CZ"/>
           </a:p>
@@ -845,6 +1066,9 @@
   <p:clrMapOvr>
     <a:masterClrMapping/>
   </p:clrMapOvr>
+  <p:transition spd="slow" advTm="90000">
+    <p:push dir="u"/>
+  </p:transition>
 </p:sldLayout>
 </file>
 
@@ -1032,7 +1256,7 @@
           <a:p>
             <a:fld id="{8A3A43DF-04A3-4662-88CA-28FDED1CFC09}" type="datetimeFigureOut">
               <a:rPr lang="cs-CZ" smtClean="0"/>
-              <a:t>17.01.2023</a:t>
+              <a:t>19.01.2023</a:t>
             </a:fld>
             <a:endParaRPr lang="cs-CZ"/>
           </a:p>
@@ -1090,6 +1314,9 @@
   <p:clrMapOvr>
     <a:masterClrMapping/>
   </p:clrMapOvr>
+  <p:transition spd="slow" advTm="90000">
+    <p:push dir="u"/>
+  </p:transition>
 </p:sldLayout>
 </file>
 
@@ -1261,7 +1488,7 @@
           <a:p>
             <a:fld id="{8A3A43DF-04A3-4662-88CA-28FDED1CFC09}" type="datetimeFigureOut">
               <a:rPr lang="cs-CZ" smtClean="0"/>
-              <a:t>17.01.2023</a:t>
+              <a:t>19.01.2023</a:t>
             </a:fld>
             <a:endParaRPr lang="cs-CZ"/>
           </a:p>
@@ -1319,6 +1546,9 @@
   <p:clrMapOvr>
     <a:masterClrMapping/>
   </p:clrMapOvr>
+  <p:transition spd="slow" advTm="90000">
+    <p:push dir="u"/>
+  </p:transition>
 </p:sldLayout>
 </file>
 
@@ -1625,7 +1855,7 @@
           <a:p>
             <a:fld id="{8A3A43DF-04A3-4662-88CA-28FDED1CFC09}" type="datetimeFigureOut">
               <a:rPr lang="cs-CZ" smtClean="0"/>
-              <a:t>17.01.2023</a:t>
+              <a:t>19.01.2023</a:t>
             </a:fld>
             <a:endParaRPr lang="cs-CZ"/>
           </a:p>
@@ -1683,6 +1913,9 @@
   <p:clrMapOvr>
     <a:masterClrMapping/>
   </p:clrMapOvr>
+  <p:transition spd="slow" advTm="90000">
+    <p:push dir="u"/>
+  </p:transition>
 </p:sldLayout>
 </file>
 
@@ -1742,7 +1975,7 @@
           <a:p>
             <a:fld id="{8A3A43DF-04A3-4662-88CA-28FDED1CFC09}" type="datetimeFigureOut">
               <a:rPr lang="cs-CZ" smtClean="0"/>
-              <a:t>17.01.2023</a:t>
+              <a:t>19.01.2023</a:t>
             </a:fld>
             <a:endParaRPr lang="cs-CZ"/>
           </a:p>
@@ -1800,6 +2033,9 @@
   <p:clrMapOvr>
     <a:masterClrMapping/>
   </p:clrMapOvr>
+  <p:transition spd="slow" advTm="90000">
+    <p:push dir="u"/>
+  </p:transition>
 </p:sldLayout>
 </file>
 
@@ -1837,7 +2073,7 @@
           <a:p>
             <a:fld id="{8A3A43DF-04A3-4662-88CA-28FDED1CFC09}" type="datetimeFigureOut">
               <a:rPr lang="cs-CZ" smtClean="0"/>
-              <a:t>17.01.2023</a:t>
+              <a:t>19.01.2023</a:t>
             </a:fld>
             <a:endParaRPr lang="cs-CZ"/>
           </a:p>
@@ -1895,6 +2131,9 @@
   <p:clrMapOvr>
     <a:masterClrMapping/>
   </p:clrMapOvr>
+  <p:transition spd="slow" advTm="90000">
+    <p:push dir="u"/>
+  </p:transition>
 </p:sldLayout>
 </file>
 
@@ -2112,7 +2351,7 @@
           <a:p>
             <a:fld id="{8A3A43DF-04A3-4662-88CA-28FDED1CFC09}" type="datetimeFigureOut">
               <a:rPr lang="cs-CZ" smtClean="0"/>
-              <a:t>17.01.2023</a:t>
+              <a:t>19.01.2023</a:t>
             </a:fld>
             <a:endParaRPr lang="cs-CZ"/>
           </a:p>
@@ -2170,6 +2409,9 @@
   <p:clrMapOvr>
     <a:masterClrMapping/>
   </p:clrMapOvr>
+  <p:transition spd="slow" advTm="90000">
+    <p:push dir="u"/>
+  </p:transition>
 </p:sldLayout>
 </file>
 
@@ -2364,7 +2606,7 @@
           <a:p>
             <a:fld id="{8A3A43DF-04A3-4662-88CA-28FDED1CFC09}" type="datetimeFigureOut">
               <a:rPr lang="cs-CZ" smtClean="0"/>
-              <a:t>17.01.2023</a:t>
+              <a:t>19.01.2023</a:t>
             </a:fld>
             <a:endParaRPr lang="cs-CZ"/>
           </a:p>
@@ -2422,6 +2664,9 @@
   <p:clrMapOvr>
     <a:masterClrMapping/>
   </p:clrMapOvr>
+  <p:transition spd="slow" advTm="90000">
+    <p:push dir="u"/>
+  </p:transition>
 </p:sldLayout>
 </file>
 
@@ -2575,7 +2820,7 @@
           <a:p>
             <a:fld id="{8A3A43DF-04A3-4662-88CA-28FDED1CFC09}" type="datetimeFigureOut">
               <a:rPr lang="cs-CZ" smtClean="0"/>
-              <a:t>17.01.2023</a:t>
+              <a:t>19.01.2023</a:t>
             </a:fld>
             <a:endParaRPr lang="cs-CZ"/>
           </a:p>
@@ -2680,6 +2925,9 @@
     <p:sldLayoutId id="2147483658" r:id="rId10"/>
     <p:sldLayoutId id="2147483659" r:id="rId11"/>
   </p:sldLayoutIdLst>
+  <p:transition spd="slow" advTm="90000">
+    <p:push dir="u"/>
+  </p:transition>
   <p:txStyles>
     <p:titleStyle>
       <a:lvl1pPr algn="l" defTabSz="914400" rtl="0" eaLnBrk="1" latinLnBrk="0" hangingPunct="1">
@@ -3607,7 +3855,7 @@
   <p:clrMapOvr>
     <a:masterClrMapping/>
   </p:clrMapOvr>
-  <p:transition spd="slow">
+  <p:transition spd="slow" advTm="3000">
     <p:push dir="u"/>
   </p:transition>
 </p:sld>
@@ -4193,8 +4441,8 @@
         </p:nvSpPr>
         <p:spPr>
           <a:xfrm>
-            <a:off x="6096000" y="820880"/>
-            <a:ext cx="5257799" cy="4889350"/>
+            <a:off x="6096000" y="1112968"/>
+            <a:ext cx="5257799" cy="4597261"/>
           </a:xfrm>
         </p:spPr>
         <p:txBody>
@@ -4202,6 +4450,14 @@
             <a:normAutofit/>
           </a:bodyPr>
           <a:lstStyle/>
+          <a:p>
+            <a:r>
+              <a:rPr lang="cs-CZ" dirty="0">
+                <a:cs typeface="Calibri"/>
+              </a:rPr>
+              <a:t>Vytvořen v roce 1995</a:t>
+            </a:r>
+          </a:p>
           <a:p>
             <a:r>
               <a:rPr lang="cs-CZ" dirty="0">
@@ -4841,6 +5097,9 @@
   <p:clrMapOvr>
     <a:masterClrMapping/>
   </p:clrMapOvr>
+  <p:transition spd="slow" advTm="90000">
+    <p:push dir="u"/>
+  </p:transition>
 </p:sld>
 </file>
 
@@ -5271,6 +5530,9 @@
   <p:clrMapOvr>
     <a:masterClrMapping/>
   </p:clrMapOvr>
+  <p:transition spd="slow" advTm="90000">
+    <p:push dir="u"/>
+  </p:transition>
 </p:sld>
 </file>
 
@@ -5677,9 +5939,17 @@
         </p:spPr>
         <p:txBody>
           <a:bodyPr vert="horz" lIns="91440" tIns="45720" rIns="91440" bIns="45720" rtlCol="0" anchor="t">
-            <a:normAutofit/>
+            <a:normAutofit lnSpcReduction="10000"/>
           </a:bodyPr>
           <a:lstStyle/>
+          <a:p>
+            <a:r>
+              <a:rPr lang="cs-CZ" dirty="0">
+                <a:cs typeface="Calibri"/>
+              </a:rPr>
+              <a:t>Vytvořen v roce 1993</a:t>
+            </a:r>
+          </a:p>
           <a:p>
             <a:r>
               <a:rPr lang="cs-CZ" dirty="0">
@@ -5724,6 +5994,9 @@
   <p:clrMapOvr>
     <a:masterClrMapping/>
   </p:clrMapOvr>
+  <p:transition spd="slow" advTm="90000">
+    <p:push dir="u"/>
+  </p:transition>
 </p:sld>
 </file>
 
@@ -6309,6 +6582,14 @@
             <a:normAutofit/>
           </a:bodyPr>
           <a:lstStyle/>
+          <a:p>
+            <a:r>
+              <a:rPr lang="cs-CZ" dirty="0">
+                <a:cs typeface="Calibri"/>
+              </a:rPr>
+              <a:t>Vytvořen v roce 2001</a:t>
+            </a:r>
+          </a:p>
           <a:p>
             <a:r>
               <a:rPr lang="cs-CZ" dirty="0">
@@ -6966,6 +7247,9 @@
   <p:clrMapOvr>
     <a:masterClrMapping/>
   </p:clrMapOvr>
+  <p:transition spd="slow" advTm="90000">
+    <p:push dir="u"/>
+  </p:transition>
 </p:sld>
 </file>
 
@@ -7555,9 +7839,17 @@
         </p:spPr>
         <p:txBody>
           <a:bodyPr vert="horz" lIns="91440" tIns="45720" rIns="91440" bIns="45720" rtlCol="0" anchor="t">
-            <a:normAutofit/>
+            <a:normAutofit lnSpcReduction="10000"/>
           </a:bodyPr>
           <a:lstStyle/>
+          <a:p>
+            <a:r>
+              <a:rPr lang="cs-CZ" dirty="0">
+                <a:cs typeface="Calibri"/>
+              </a:rPr>
+              <a:t>Vytvořen v roce 2006</a:t>
+            </a:r>
+          </a:p>
           <a:p>
             <a:r>
               <a:rPr lang="cs-CZ" dirty="0">
@@ -8233,6 +8525,9 @@
   <p:clrMapOvr>
     <a:masterClrMapping/>
   </p:clrMapOvr>
+  <p:transition spd="slow" advTm="90000">
+    <p:push dir="u"/>
+  </p:transition>
 </p:sld>
 </file>
 
@@ -8574,7 +8869,7 @@
               </a:spcBef>
             </a:pPr>
             <a:r>
-              <a:rPr lang="cs-CZ" sz="1100" err="1">
+              <a:rPr lang="cs-CZ" sz="1100" dirty="0" err="1">
                 <a:ea typeface="+mn-lt"/>
                 <a:cs typeface="+mn-lt"/>
               </a:rPr>
@@ -8588,7 +8883,7 @@
               <a:t> </a:t>
             </a:r>
             <a:r>
-              <a:rPr lang="cs-CZ" sz="1100" err="1">
+              <a:rPr lang="cs-CZ" sz="1100" dirty="0" err="1">
                 <a:ea typeface="+mn-lt"/>
                 <a:cs typeface="+mn-lt"/>
               </a:rPr>
@@ -8602,7 +8897,7 @@
               <a:t> a </a:t>
             </a:r>
             <a:r>
-              <a:rPr lang="cs-CZ" sz="1100" err="1">
+              <a:rPr lang="cs-CZ" sz="1100" dirty="0" err="1">
                 <a:ea typeface="+mn-lt"/>
                 <a:cs typeface="+mn-lt"/>
               </a:rPr>
@@ -8616,7 +8911,7 @@
               <a:t> </a:t>
             </a:r>
             <a:r>
-              <a:rPr lang="cs-CZ" sz="1100" err="1">
+              <a:rPr lang="cs-CZ" sz="1100" dirty="0" err="1">
                 <a:ea typeface="+mn-lt"/>
                 <a:cs typeface="+mn-lt"/>
               </a:rPr>
@@ -8630,7 +8925,7 @@
               <a:t>?. </a:t>
             </a:r>
             <a:r>
-              <a:rPr lang="cs-CZ" sz="1100" i="1" err="1">
+              <a:rPr lang="cs-CZ" sz="1100" i="1" dirty="0" err="1">
                 <a:ea typeface="+mn-lt"/>
                 <a:cs typeface="+mn-lt"/>
               </a:rPr>
@@ -8644,7 +8939,7 @@
               <a:t> </a:t>
             </a:r>
             <a:r>
-              <a:rPr lang="cs-CZ" sz="1100" i="1" err="1">
+              <a:rPr lang="cs-CZ" sz="1100" i="1" dirty="0" err="1">
                 <a:ea typeface="+mn-lt"/>
                 <a:cs typeface="+mn-lt"/>
               </a:rPr>
@@ -8658,7 +8953,7 @@
               <a:t> Data </a:t>
             </a:r>
             <a:r>
-              <a:rPr lang="cs-CZ" sz="1100" i="1" err="1">
+              <a:rPr lang="cs-CZ" sz="1100" i="1" dirty="0" err="1">
                 <a:ea typeface="+mn-lt"/>
                 <a:cs typeface="+mn-lt"/>
               </a:rPr>
@@ -8672,7 +8967,7 @@
               <a:t> </a:t>
             </a:r>
             <a:r>
-              <a:rPr lang="cs-CZ" sz="1100" i="1" err="1">
+              <a:rPr lang="cs-CZ" sz="1100" i="1" dirty="0" err="1">
                 <a:ea typeface="+mn-lt"/>
                 <a:cs typeface="+mn-lt"/>
               </a:rPr>
@@ -8686,7 +8981,7 @@
               <a:t> Tech Sales and Marketing - </a:t>
             </a:r>
             <a:r>
-              <a:rPr lang="cs-CZ" sz="1100" i="1" err="1">
+              <a:rPr lang="cs-CZ" sz="1100" i="1" dirty="0" err="1">
                 <a:ea typeface="+mn-lt"/>
                 <a:cs typeface="+mn-lt"/>
               </a:rPr>
@@ -8707,7 +9002,7 @@
               </a:rPr>
               <a:t>https://www.techtarget.com/searchstorage/definition/file-system</a:t>
             </a:r>
-            <a:endParaRPr lang="cs-CZ" sz="1100">
+            <a:endParaRPr lang="cs-CZ" sz="1100" dirty="0">
               <a:cs typeface="Calibri"/>
             </a:endParaRPr>
           </a:p>
@@ -8718,7 +9013,7 @@
               </a:spcBef>
             </a:pPr>
             <a:r>
-              <a:rPr lang="cs-CZ" sz="1100" err="1">
+              <a:rPr lang="cs-CZ" sz="1100" dirty="0" err="1">
                 <a:ea typeface="+mn-lt"/>
                 <a:cs typeface="+mn-lt"/>
               </a:rPr>
@@ -8732,7 +9027,7 @@
               <a:t> </a:t>
             </a:r>
             <a:r>
-              <a:rPr lang="cs-CZ" sz="1100" err="1">
+              <a:rPr lang="cs-CZ" sz="1100" dirty="0" err="1">
                 <a:ea typeface="+mn-lt"/>
                 <a:cs typeface="+mn-lt"/>
               </a:rPr>
@@ -8746,7 +9041,7 @@
               <a:t> </a:t>
             </a:r>
             <a:r>
-              <a:rPr lang="cs-CZ" sz="1100" err="1">
+              <a:rPr lang="cs-CZ" sz="1100" dirty="0" err="1">
                 <a:ea typeface="+mn-lt"/>
                 <a:cs typeface="+mn-lt"/>
               </a:rPr>
@@ -8760,7 +9055,7 @@
               <a:t> </a:t>
             </a:r>
             <a:r>
-              <a:rPr lang="cs-CZ" sz="1100" err="1">
+              <a:rPr lang="cs-CZ" sz="1100" dirty="0" err="1">
                 <a:ea typeface="+mn-lt"/>
                 <a:cs typeface="+mn-lt"/>
               </a:rPr>
@@ -8774,7 +9069,7 @@
               <a:t> Table (FAT)?. </a:t>
             </a:r>
             <a:r>
-              <a:rPr lang="cs-CZ" sz="1100" i="1" err="1">
+              <a:rPr lang="cs-CZ" sz="1100" i="1" dirty="0" err="1">
                 <a:ea typeface="+mn-lt"/>
                 <a:cs typeface="+mn-lt"/>
               </a:rPr>
@@ -8788,7 +9083,7 @@
               <a:t> </a:t>
             </a:r>
             <a:r>
-              <a:rPr lang="cs-CZ" sz="1100" i="1" err="1">
+              <a:rPr lang="cs-CZ" sz="1100" i="1" dirty="0" err="1">
                 <a:ea typeface="+mn-lt"/>
                 <a:cs typeface="+mn-lt"/>
               </a:rPr>
@@ -8802,7 +9097,7 @@
               <a:t> Data </a:t>
             </a:r>
             <a:r>
-              <a:rPr lang="cs-CZ" sz="1100" i="1" err="1">
+              <a:rPr lang="cs-CZ" sz="1100" i="1" dirty="0" err="1">
                 <a:ea typeface="+mn-lt"/>
                 <a:cs typeface="+mn-lt"/>
               </a:rPr>
@@ -8816,7 +9111,7 @@
               <a:t> </a:t>
             </a:r>
             <a:r>
-              <a:rPr lang="cs-CZ" sz="1100" i="1" err="1">
+              <a:rPr lang="cs-CZ" sz="1100" i="1" dirty="0" err="1">
                 <a:ea typeface="+mn-lt"/>
                 <a:cs typeface="+mn-lt"/>
               </a:rPr>
@@ -8830,7 +9125,7 @@
               <a:t> Tech Sales and Marketing - </a:t>
             </a:r>
             <a:r>
-              <a:rPr lang="cs-CZ" sz="1100" i="1" err="1">
+              <a:rPr lang="cs-CZ" sz="1100" i="1" dirty="0" err="1">
                 <a:ea typeface="+mn-lt"/>
                 <a:cs typeface="+mn-lt"/>
               </a:rPr>
@@ -8863,7 +9158,7 @@
               </a:spcBef>
             </a:pPr>
             <a:r>
-              <a:rPr lang="cs-CZ" sz="1100" err="1">
+              <a:rPr lang="cs-CZ" sz="1100" dirty="0" err="1">
                 <a:ea typeface="+mn-lt"/>
                 <a:cs typeface="+mn-lt"/>
               </a:rPr>
@@ -8877,7 +9172,7 @@
               <a:t> </a:t>
             </a:r>
             <a:r>
-              <a:rPr lang="cs-CZ" sz="1100" err="1">
+              <a:rPr lang="cs-CZ" sz="1100" dirty="0" err="1">
                 <a:ea typeface="+mn-lt"/>
                 <a:cs typeface="+mn-lt"/>
               </a:rPr>
@@ -8891,7 +9186,7 @@
               <a:t> </a:t>
             </a:r>
             <a:r>
-              <a:rPr lang="cs-CZ" sz="1100" err="1">
+              <a:rPr lang="cs-CZ" sz="1100" dirty="0" err="1">
                 <a:ea typeface="+mn-lt"/>
                 <a:cs typeface="+mn-lt"/>
               </a:rPr>
@@ -8905,7 +9200,7 @@
               <a:t> </a:t>
             </a:r>
             <a:r>
-              <a:rPr lang="cs-CZ" sz="1100" err="1">
+              <a:rPr lang="cs-CZ" sz="1100" dirty="0" err="1">
                 <a:ea typeface="+mn-lt"/>
                 <a:cs typeface="+mn-lt"/>
               </a:rPr>
@@ -8919,7 +9214,7 @@
               <a:t> Table (FAT)?. </a:t>
             </a:r>
             <a:r>
-              <a:rPr lang="cs-CZ" sz="1100" i="1" err="1">
+              <a:rPr lang="cs-CZ" sz="1100" i="1" dirty="0" err="1">
                 <a:ea typeface="+mn-lt"/>
                 <a:cs typeface="+mn-lt"/>
               </a:rPr>
@@ -8933,7 +9228,7 @@
               <a:t>: Tech </a:t>
             </a:r>
             <a:r>
-              <a:rPr lang="cs-CZ" sz="1100" i="1" err="1">
+              <a:rPr lang="cs-CZ" sz="1100" i="1" dirty="0" err="1">
                 <a:ea typeface="+mn-lt"/>
                 <a:cs typeface="+mn-lt"/>
               </a:rPr>
@@ -8947,7 +9242,7 @@
               <a:t>, </a:t>
             </a:r>
             <a:r>
-              <a:rPr lang="cs-CZ" sz="1100" i="1" err="1">
+              <a:rPr lang="cs-CZ" sz="1100" i="1" dirty="0" err="1">
                 <a:ea typeface="+mn-lt"/>
                 <a:cs typeface="+mn-lt"/>
               </a:rPr>
@@ -8961,7 +9256,7 @@
               <a:t>, </a:t>
             </a:r>
             <a:r>
-              <a:rPr lang="cs-CZ" sz="1100" i="1" err="1">
+              <a:rPr lang="cs-CZ" sz="1100" i="1" dirty="0" err="1">
                 <a:ea typeface="+mn-lt"/>
                 <a:cs typeface="+mn-lt"/>
               </a:rPr>
@@ -8975,7 +9270,7 @@
               <a:t> &amp; </a:t>
             </a:r>
             <a:r>
-              <a:rPr lang="cs-CZ" sz="1100" i="1" err="1">
+              <a:rPr lang="cs-CZ" sz="1100" i="1" dirty="0" err="1">
                 <a:ea typeface="+mn-lt"/>
                 <a:cs typeface="+mn-lt"/>
               </a:rPr>
@@ -8996,7 +9291,7 @@
               </a:rPr>
               <a:t>https://www.lifewire.com/what-is-file-allocation-table-fat-2625877</a:t>
             </a:r>
-            <a:endParaRPr lang="cs-CZ" sz="1100">
+            <a:endParaRPr lang="cs-CZ" sz="1100" dirty="0">
               <a:cs typeface="Calibri"/>
             </a:endParaRPr>
           </a:p>
@@ -9007,7 +9302,7 @@
               </a:spcBef>
             </a:pPr>
             <a:r>
-              <a:rPr lang="cs-CZ" sz="1100" err="1">
+              <a:rPr lang="cs-CZ" sz="1100" dirty="0" err="1">
                 <a:ea typeface="+mn-lt"/>
                 <a:cs typeface="+mn-lt"/>
               </a:rPr>
@@ -9021,7 +9316,7 @@
               <a:t> </a:t>
             </a:r>
             <a:r>
-              <a:rPr lang="cs-CZ" sz="1100" err="1">
+              <a:rPr lang="cs-CZ" sz="1100" dirty="0" err="1">
                 <a:ea typeface="+mn-lt"/>
                 <a:cs typeface="+mn-lt"/>
               </a:rPr>
@@ -9035,7 +9330,7 @@
               <a:t> NTFS and </a:t>
             </a:r>
             <a:r>
-              <a:rPr lang="cs-CZ" sz="1100" err="1">
+              <a:rPr lang="cs-CZ" sz="1100" dirty="0" err="1">
                 <a:ea typeface="+mn-lt"/>
                 <a:cs typeface="+mn-lt"/>
               </a:rPr>
@@ -9049,7 +9344,7 @@
               <a:t> </a:t>
             </a:r>
             <a:r>
-              <a:rPr lang="cs-CZ" sz="1100" err="1">
+              <a:rPr lang="cs-CZ" sz="1100" dirty="0" err="1">
                 <a:ea typeface="+mn-lt"/>
                 <a:cs typeface="+mn-lt"/>
               </a:rPr>
@@ -9063,7 +9358,7 @@
               <a:t> It </a:t>
             </a:r>
             <a:r>
-              <a:rPr lang="cs-CZ" sz="1100" err="1">
+              <a:rPr lang="cs-CZ" sz="1100" dirty="0" err="1">
                 <a:ea typeface="+mn-lt"/>
                 <a:cs typeface="+mn-lt"/>
               </a:rPr>
@@ -9077,7 +9372,7 @@
               <a:t>?. </a:t>
             </a:r>
             <a:r>
-              <a:rPr lang="cs-CZ" sz="1100" i="1" err="1">
+              <a:rPr lang="cs-CZ" sz="1100" i="1" dirty="0" err="1">
                 <a:ea typeface="+mn-lt"/>
                 <a:cs typeface="+mn-lt"/>
               </a:rPr>
@@ -9091,7 +9386,7 @@
               <a:t> | </a:t>
             </a:r>
             <a:r>
-              <a:rPr lang="cs-CZ" sz="1100" i="1" err="1">
+              <a:rPr lang="cs-CZ" sz="1100" i="1" dirty="0" err="1">
                 <a:ea typeface="+mn-lt"/>
                 <a:cs typeface="+mn-lt"/>
               </a:rPr>
@@ -9105,7 +9400,7 @@
               <a:t> </a:t>
             </a:r>
             <a:r>
-              <a:rPr lang="cs-CZ" sz="1100" i="1" err="1">
+              <a:rPr lang="cs-CZ" sz="1100" i="1" dirty="0" err="1">
                 <a:ea typeface="+mn-lt"/>
                 <a:cs typeface="+mn-lt"/>
               </a:rPr>
@@ -9119,7 +9414,7 @@
               <a:t> </a:t>
             </a:r>
             <a:r>
-              <a:rPr lang="cs-CZ" sz="1100" i="1" err="1">
+              <a:rPr lang="cs-CZ" sz="1100" i="1" dirty="0" err="1">
                 <a:ea typeface="+mn-lt"/>
                 <a:cs typeface="+mn-lt"/>
               </a:rPr>
@@ -9133,7 +9428,7 @@
               <a:t> Provider Technology </a:t>
             </a:r>
             <a:r>
-              <a:rPr lang="cs-CZ" sz="1100" i="1" err="1">
+              <a:rPr lang="cs-CZ" sz="1100" i="1" dirty="0" err="1">
                 <a:ea typeface="+mn-lt"/>
                 <a:cs typeface="+mn-lt"/>
               </a:rPr>
@@ -9154,7 +9449,7 @@
               </a:rPr>
               <a:t>https://www.datto.com/blog/what-is-ntfs-and-how-does-it-work</a:t>
             </a:r>
-            <a:endParaRPr lang="cs-CZ" sz="1100">
+            <a:endParaRPr lang="cs-CZ" sz="1100" dirty="0">
               <a:cs typeface="Calibri"/>
             </a:endParaRPr>
           </a:p>
@@ -9165,7 +9460,7 @@
               </a:spcBef>
             </a:pPr>
             <a:r>
-              <a:rPr lang="cs-CZ" sz="1100" err="1">
+              <a:rPr lang="cs-CZ" sz="1100" dirty="0" err="1">
                 <a:ea typeface="+mn-lt"/>
                 <a:cs typeface="+mn-lt"/>
               </a:rPr>
@@ -9179,7 +9474,7 @@
               <a:t> </a:t>
             </a:r>
             <a:r>
-              <a:rPr lang="cs-CZ" sz="1100" err="1">
+              <a:rPr lang="cs-CZ" sz="1100" dirty="0" err="1">
                 <a:ea typeface="+mn-lt"/>
                 <a:cs typeface="+mn-lt"/>
               </a:rPr>
@@ -9193,7 +9488,7 @@
               <a:t> NTFS And </a:t>
             </a:r>
             <a:r>
-              <a:rPr lang="cs-CZ" sz="1100" err="1">
+              <a:rPr lang="cs-CZ" sz="1100" dirty="0" err="1">
                 <a:ea typeface="+mn-lt"/>
                 <a:cs typeface="+mn-lt"/>
               </a:rPr>
@@ -9207,7 +9502,7 @@
               <a:t> </a:t>
             </a:r>
             <a:r>
-              <a:rPr lang="cs-CZ" sz="1100" err="1">
+              <a:rPr lang="cs-CZ" sz="1100" dirty="0" err="1">
                 <a:ea typeface="+mn-lt"/>
                 <a:cs typeface="+mn-lt"/>
               </a:rPr>
@@ -9221,7 +9516,7 @@
               <a:t> It </a:t>
             </a:r>
             <a:r>
-              <a:rPr lang="cs-CZ" sz="1100" err="1">
+              <a:rPr lang="cs-CZ" sz="1100" dirty="0" err="1">
                 <a:ea typeface="+mn-lt"/>
                 <a:cs typeface="+mn-lt"/>
               </a:rPr>
@@ -9235,7 +9530,7 @@
               <a:t>?. </a:t>
             </a:r>
             <a:r>
-              <a:rPr lang="cs-CZ" sz="1100" i="1" err="1">
+              <a:rPr lang="cs-CZ" sz="1100" i="1" dirty="0" err="1">
                 <a:ea typeface="+mn-lt"/>
                 <a:cs typeface="+mn-lt"/>
               </a:rPr>
@@ -9249,7 +9544,7 @@
               <a:t> </a:t>
             </a:r>
             <a:r>
-              <a:rPr lang="cs-CZ" sz="1100" i="1" err="1">
+              <a:rPr lang="cs-CZ" sz="1100" i="1" dirty="0" err="1">
                 <a:ea typeface="+mn-lt"/>
                 <a:cs typeface="+mn-lt"/>
               </a:rPr>
@@ -9263,7 +9558,7 @@
               <a:t> Data </a:t>
             </a:r>
             <a:r>
-              <a:rPr lang="cs-CZ" sz="1100" i="1" err="1">
+              <a:rPr lang="cs-CZ" sz="1100" i="1" dirty="0" err="1">
                 <a:ea typeface="+mn-lt"/>
                 <a:cs typeface="+mn-lt"/>
               </a:rPr>
@@ -9277,7 +9572,7 @@
               <a:t> </a:t>
             </a:r>
             <a:r>
-              <a:rPr lang="cs-CZ" sz="1100" i="1" err="1">
+              <a:rPr lang="cs-CZ" sz="1100" i="1" dirty="0" err="1">
                 <a:ea typeface="+mn-lt"/>
                 <a:cs typeface="+mn-lt"/>
               </a:rPr>
@@ -9291,7 +9586,7 @@
               <a:t> Tech Sales and Marketing - </a:t>
             </a:r>
             <a:r>
-              <a:rPr lang="cs-CZ" sz="1100" i="1" err="1">
+              <a:rPr lang="cs-CZ" sz="1100" i="1" dirty="0" err="1">
                 <a:ea typeface="+mn-lt"/>
                 <a:cs typeface="+mn-lt"/>
               </a:rPr>
@@ -9312,7 +9607,7 @@
               </a:rPr>
               <a:t>https://www.techtarget.com/searchwindowsserver/definition/NTFS</a:t>
             </a:r>
-            <a:endParaRPr lang="cs-CZ" sz="1100">
+            <a:endParaRPr lang="cs-CZ" sz="1100" dirty="0">
               <a:ea typeface="+mn-lt"/>
               <a:cs typeface="+mn-lt"/>
             </a:endParaRPr>
@@ -9338,7 +9633,7 @@
               </a:rPr>
               <a:t>https://cs.wikipedia.org/wiki/Cluster_(pevn%C3%BD_disk)</a:t>
             </a:r>
-            <a:endParaRPr lang="cs-CZ" sz="1100">
+            <a:endParaRPr lang="cs-CZ" sz="1100" dirty="0">
               <a:ea typeface="+mn-lt"/>
               <a:cs typeface="+mn-lt"/>
             </a:endParaRPr>
@@ -9350,7 +9645,7 @@
               </a:spcBef>
             </a:pPr>
             <a:r>
-              <a:rPr lang="cs-CZ" sz="1100" err="1">
+              <a:rPr lang="cs-CZ" sz="1100" dirty="0" err="1">
                 <a:ea typeface="+mn-lt"/>
                 <a:cs typeface="+mn-lt"/>
               </a:rPr>
@@ -9364,7 +9659,7 @@
               <a:t> </a:t>
             </a:r>
             <a:r>
-              <a:rPr lang="cs-CZ" sz="1100" err="1">
+              <a:rPr lang="cs-CZ" sz="1100" dirty="0" err="1">
                 <a:ea typeface="+mn-lt"/>
                 <a:cs typeface="+mn-lt"/>
               </a:rPr>
@@ -9378,7 +9673,7 @@
               <a:t> </a:t>
             </a:r>
             <a:r>
-              <a:rPr lang="cs-CZ" sz="1100" err="1">
+              <a:rPr lang="cs-CZ" sz="1100" dirty="0" err="1">
                 <a:ea typeface="+mn-lt"/>
                 <a:cs typeface="+mn-lt"/>
               </a:rPr>
@@ -9392,7 +9687,7 @@
               <a:t> (</a:t>
             </a:r>
             <a:r>
-              <a:rPr lang="cs-CZ" sz="1100" err="1">
+              <a:rPr lang="cs-CZ" sz="1100" dirty="0" err="1">
                 <a:ea typeface="+mn-lt"/>
                 <a:cs typeface="+mn-lt"/>
               </a:rPr>
@@ -9406,7 +9701,7 @@
               <a:t>) - </a:t>
             </a:r>
             <a:r>
-              <a:rPr lang="cs-CZ" sz="1100" err="1">
+              <a:rPr lang="cs-CZ" sz="1100" dirty="0" err="1">
                 <a:ea typeface="+mn-lt"/>
                 <a:cs typeface="+mn-lt"/>
               </a:rPr>
@@ -9420,7 +9715,7 @@
               <a:t> </a:t>
             </a:r>
             <a:r>
-              <a:rPr lang="cs-CZ" sz="1100" err="1">
+              <a:rPr lang="cs-CZ" sz="1100" dirty="0" err="1">
                 <a:ea typeface="+mn-lt"/>
                 <a:cs typeface="+mn-lt"/>
               </a:rPr>
@@ -9434,7 +9729,7 @@
               <a:t> </a:t>
             </a:r>
             <a:r>
-              <a:rPr lang="cs-CZ" sz="1100" err="1">
+              <a:rPr lang="cs-CZ" sz="1100" dirty="0" err="1">
                 <a:ea typeface="+mn-lt"/>
                 <a:cs typeface="+mn-lt"/>
               </a:rPr>
@@ -9448,7 +9743,7 @@
               <a:t> to </a:t>
             </a:r>
             <a:r>
-              <a:rPr lang="cs-CZ" sz="1100" err="1">
+              <a:rPr lang="cs-CZ" sz="1100" dirty="0" err="1">
                 <a:ea typeface="+mn-lt"/>
                 <a:cs typeface="+mn-lt"/>
               </a:rPr>
@@ -9469,7 +9764,7 @@
               <a:t>[</a:t>
             </a:r>
             <a:r>
-              <a:rPr lang="cs-CZ" sz="1100" i="1" err="1">
+              <a:rPr lang="cs-CZ" sz="1100" i="1" dirty="0" err="1">
                 <a:ea typeface="+mn-lt"/>
                 <a:cs typeface="+mn-lt"/>
               </a:rPr>
@@ -9483,7 +9778,7 @@
               <a:t>] </a:t>
             </a:r>
             <a:r>
-              <a:rPr lang="cs-CZ" sz="1100" i="1" err="1">
+              <a:rPr lang="cs-CZ" sz="1100" i="1" dirty="0" err="1">
                 <a:ea typeface="+mn-lt"/>
                 <a:cs typeface="+mn-lt"/>
               </a:rPr>
@@ -9497,7 +9792,7 @@
               <a:t> - </a:t>
             </a:r>
             <a:r>
-              <a:rPr lang="cs-CZ" sz="1100" i="1" err="1">
+              <a:rPr lang="cs-CZ" sz="1100" i="1" dirty="0" err="1">
                 <a:ea typeface="+mn-lt"/>
                 <a:cs typeface="+mn-lt"/>
               </a:rPr>
@@ -9511,7 +9806,7 @@
               <a:t> Data </a:t>
             </a:r>
             <a:r>
-              <a:rPr lang="cs-CZ" sz="1100" i="1" err="1">
+              <a:rPr lang="cs-CZ" sz="1100" i="1" dirty="0" err="1">
                 <a:ea typeface="+mn-lt"/>
                 <a:cs typeface="+mn-lt"/>
               </a:rPr>
@@ -9525,7 +9820,7 @@
               <a:t> </a:t>
             </a:r>
             <a:r>
-              <a:rPr lang="cs-CZ" sz="1100" i="1" err="1">
+              <a:rPr lang="cs-CZ" sz="1100" i="1" dirty="0" err="1">
                 <a:ea typeface="+mn-lt"/>
                 <a:cs typeface="+mn-lt"/>
               </a:rPr>
@@ -9539,7 +9834,7 @@
               <a:t> </a:t>
             </a:r>
             <a:r>
-              <a:rPr lang="cs-CZ" sz="1100" i="1" err="1">
+              <a:rPr lang="cs-CZ" sz="1100" i="1" dirty="0" err="1">
                 <a:ea typeface="+mn-lt"/>
                 <a:cs typeface="+mn-lt"/>
               </a:rPr>
@@ -9567,7 +9862,7 @@
               </a:rPr>
               <a:t>https://recoverit.wondershare.com/file-system/refs-file-system.html</a:t>
             </a:r>
-            <a:endParaRPr lang="cs-CZ" sz="1100">
+            <a:endParaRPr lang="cs-CZ" sz="1100" dirty="0">
               <a:ea typeface="+mn-lt"/>
               <a:cs typeface="+mn-lt"/>
             </a:endParaRPr>
@@ -9605,7 +9900,7 @@
               </a:spcBef>
             </a:pPr>
             <a:r>
-              <a:rPr lang="cs-CZ" sz="1100" err="1">
+              <a:rPr lang="cs-CZ" sz="1100" dirty="0" err="1">
                 <a:ea typeface="+mn-lt"/>
                 <a:cs typeface="+mn-lt"/>
               </a:rPr>
@@ -9619,7 +9914,7 @@
               <a:t> </a:t>
             </a:r>
             <a:r>
-              <a:rPr lang="cs-CZ" sz="1100" err="1">
+              <a:rPr lang="cs-CZ" sz="1100" dirty="0" err="1">
                 <a:ea typeface="+mn-lt"/>
                 <a:cs typeface="+mn-lt"/>
               </a:rPr>
@@ -9633,7 +9928,7 @@
               <a:t> A Universal Disk </a:t>
             </a:r>
             <a:r>
-              <a:rPr lang="cs-CZ" sz="1100" err="1">
+              <a:rPr lang="cs-CZ" sz="1100" dirty="0" err="1">
                 <a:ea typeface="+mn-lt"/>
                 <a:cs typeface="+mn-lt"/>
               </a:rPr>
@@ -9647,7 +9942,7 @@
               <a:t> (UDF) – </a:t>
             </a:r>
             <a:r>
-              <a:rPr lang="cs-CZ" sz="1100" err="1">
+              <a:rPr lang="cs-CZ" sz="1100" dirty="0" err="1">
                 <a:ea typeface="+mn-lt"/>
                 <a:cs typeface="+mn-lt"/>
               </a:rPr>
@@ -9661,7 +9956,7 @@
               <a:t>. </a:t>
             </a:r>
             <a:r>
-              <a:rPr lang="cs-CZ" sz="1100" i="1" err="1">
+              <a:rPr lang="cs-CZ" sz="1100" i="1" dirty="0" err="1">
                 <a:ea typeface="+mn-lt"/>
                 <a:cs typeface="+mn-lt"/>
               </a:rPr>
@@ -9675,7 +9970,7 @@
               <a:t> | </a:t>
             </a:r>
             <a:r>
-              <a:rPr lang="cs-CZ" sz="1100" i="1" err="1">
+              <a:rPr lang="cs-CZ" sz="1100" i="1" dirty="0" err="1">
                 <a:ea typeface="+mn-lt"/>
                 <a:cs typeface="+mn-lt"/>
               </a:rPr>
@@ -9689,7 +9984,7 @@
               <a:t> </a:t>
             </a:r>
             <a:r>
-              <a:rPr lang="cs-CZ" sz="1100" i="1" err="1">
+              <a:rPr lang="cs-CZ" sz="1100" i="1" dirty="0" err="1">
                 <a:ea typeface="+mn-lt"/>
                 <a:cs typeface="+mn-lt"/>
               </a:rPr>
@@ -9703,7 +9998,7 @@
               <a:t> </a:t>
             </a:r>
             <a:r>
-              <a:rPr lang="cs-CZ" sz="1100" i="1" err="1">
+              <a:rPr lang="cs-CZ" sz="1100" i="1" dirty="0" err="1">
                 <a:ea typeface="+mn-lt"/>
                 <a:cs typeface="+mn-lt"/>
               </a:rPr>
@@ -9717,7 +10012,7 @@
               <a:t> </a:t>
             </a:r>
             <a:r>
-              <a:rPr lang="cs-CZ" sz="1100" i="1" err="1">
+              <a:rPr lang="cs-CZ" sz="1100" i="1" dirty="0" err="1">
                 <a:ea typeface="+mn-lt"/>
                 <a:cs typeface="+mn-lt"/>
               </a:rPr>
@@ -9731,7 +10026,7 @@
               <a:t> Data </a:t>
             </a:r>
             <a:r>
-              <a:rPr lang="cs-CZ" sz="1100" i="1" err="1">
+              <a:rPr lang="cs-CZ" sz="1100" i="1" dirty="0" err="1">
                 <a:ea typeface="+mn-lt"/>
                 <a:cs typeface="+mn-lt"/>
               </a:rPr>
@@ -9771,7 +10066,7 @@
               <a:t>Basic Linux </a:t>
             </a:r>
             <a:r>
-              <a:rPr lang="cs-CZ" sz="1100" err="1">
+              <a:rPr lang="cs-CZ" sz="1100" dirty="0" err="1">
                 <a:ea typeface="+mn-lt"/>
                 <a:cs typeface="+mn-lt"/>
               </a:rPr>
@@ -9785,7 +10080,7 @@
               <a:t> </a:t>
             </a:r>
             <a:r>
-              <a:rPr lang="cs-CZ" sz="1100" err="1">
+              <a:rPr lang="cs-CZ" sz="1100" dirty="0" err="1">
                 <a:ea typeface="+mn-lt"/>
                 <a:cs typeface="+mn-lt"/>
               </a:rPr>
@@ -9799,7 +10094,7 @@
               <a:t> </a:t>
             </a:r>
             <a:r>
-              <a:rPr lang="cs-CZ" sz="1100" err="1">
+              <a:rPr lang="cs-CZ" sz="1100" dirty="0" err="1">
                 <a:ea typeface="+mn-lt"/>
                 <a:cs typeface="+mn-lt"/>
               </a:rPr>
@@ -9813,7 +10108,7 @@
               <a:t> – ext2, ext3, ext4, JFS and XFS – </a:t>
             </a:r>
             <a:r>
-              <a:rPr lang="cs-CZ" sz="1100" err="1">
+              <a:rPr lang="cs-CZ" sz="1100" dirty="0" err="1">
                 <a:ea typeface="+mn-lt"/>
                 <a:cs typeface="+mn-lt"/>
               </a:rPr>
@@ -9827,7 +10122,7 @@
               <a:t> Geek </a:t>
             </a:r>
             <a:r>
-              <a:rPr lang="cs-CZ" sz="1100" err="1">
+              <a:rPr lang="cs-CZ" sz="1100" dirty="0" err="1">
                 <a:ea typeface="+mn-lt"/>
                 <a:cs typeface="+mn-lt"/>
               </a:rPr>
@@ -9841,7 +10136,7 @@
               <a:t>. </a:t>
             </a:r>
             <a:r>
-              <a:rPr lang="cs-CZ" sz="1100" i="1" err="1">
+              <a:rPr lang="cs-CZ" sz="1100" i="1" dirty="0" err="1">
                 <a:ea typeface="+mn-lt"/>
                 <a:cs typeface="+mn-lt"/>
               </a:rPr>
@@ -9855,7 +10150,7 @@
               <a:t> Geek </a:t>
             </a:r>
             <a:r>
-              <a:rPr lang="cs-CZ" sz="1100" i="1" err="1">
+              <a:rPr lang="cs-CZ" sz="1100" i="1" dirty="0" err="1">
                 <a:ea typeface="+mn-lt"/>
                 <a:cs typeface="+mn-lt"/>
               </a:rPr>
@@ -9888,7 +10183,7 @@
               </a:spcBef>
             </a:pPr>
             <a:r>
-              <a:rPr lang="cs-CZ" sz="1100" err="1">
+              <a:rPr lang="cs-CZ" sz="1100" dirty="0" err="1">
                 <a:ea typeface="+mn-lt"/>
                 <a:cs typeface="+mn-lt"/>
               </a:rPr>
@@ -9902,7 +10197,7 @@
               <a:t> </a:t>
             </a:r>
             <a:r>
-              <a:rPr lang="cs-CZ" sz="1100" err="1">
+              <a:rPr lang="cs-CZ" sz="1100" dirty="0" err="1">
                 <a:ea typeface="+mn-lt"/>
                 <a:cs typeface="+mn-lt"/>
               </a:rPr>
@@ -9916,7 +10211,7 @@
               <a:t> </a:t>
             </a:r>
             <a:r>
-              <a:rPr lang="cs-CZ" sz="1100" err="1">
+              <a:rPr lang="cs-CZ" sz="1100" dirty="0" err="1">
                 <a:ea typeface="+mn-lt"/>
                 <a:cs typeface="+mn-lt"/>
               </a:rPr>
@@ -9995,19 +10290,19 @@
             </a:endParaRPr>
           </a:p>
           <a:p>
-            <a:endParaRPr lang="cs-CZ" sz="900">
+            <a:endParaRPr lang="cs-CZ" sz="900" dirty="0">
               <a:ea typeface="+mn-lt"/>
               <a:cs typeface="+mn-lt"/>
             </a:endParaRPr>
           </a:p>
           <a:p>
-            <a:endParaRPr lang="cs-CZ" sz="900">
+            <a:endParaRPr lang="cs-CZ" sz="900" dirty="0">
               <a:ea typeface="+mn-lt"/>
               <a:cs typeface="+mn-lt"/>
             </a:endParaRPr>
           </a:p>
           <a:p>
-            <a:endParaRPr lang="cs-CZ" sz="900">
+            <a:endParaRPr lang="cs-CZ" sz="900" dirty="0">
               <a:ea typeface="+mn-lt"/>
               <a:cs typeface="+mn-lt"/>
             </a:endParaRPr>
@@ -10024,7 +10319,7 @@
   <p:clrMapOvr>
     <a:masterClrMapping/>
   </p:clrMapOvr>
-  <p:transition spd="slow">
+  <p:transition spd="slow" advTm="3000">
     <p:push dir="u"/>
   </p:transition>
 </p:sld>
@@ -10544,6 +10839,9 @@
   <p:clrMapOvr>
     <a:masterClrMapping/>
   </p:clrMapOvr>
+  <p:transition spd="slow" advTm="3000">
+    <p:push dir="u"/>
+  </p:transition>
 </p:sld>
 </file>
 
@@ -11132,7 +11430,7 @@
           <a:lstStyle/>
           <a:p>
             <a:r>
-              <a:rPr lang="cs-CZ">
+              <a:rPr lang="cs-CZ" dirty="0">
                 <a:cs typeface="Calibri"/>
               </a:rPr>
               <a:t>Jsou to způsoby organizace dat na disk v podobě souborů a složek</a:t>
@@ -11140,10 +11438,10 @@
           </a:p>
           <a:p>
             <a:r>
-              <a:rPr lang="cs-CZ">
+              <a:rPr lang="cs-CZ" dirty="0">
                 <a:cs typeface="Calibri"/>
               </a:rPr>
-              <a:t>Disky jsou rozděleny do clusterů, což jsou bloky dat kde může soubor být uložen</a:t>
+              <a:t>Disky jsou většinou rozděleny do clusterů, což jsou bloky dat kde soubor může být uložen</a:t>
             </a:r>
           </a:p>
         </p:txBody>
@@ -11748,7 +12046,7 @@
   <p:clrMapOvr>
     <a:masterClrMapping/>
   </p:clrMapOvr>
-  <p:transition spd="slow">
+  <p:transition spd="slow" advTm="30000">
     <p:push dir="u"/>
   </p:transition>
 </p:sld>
@@ -12193,7 +12491,7 @@
   <p:clrMapOvr>
     <a:masterClrMapping/>
   </p:clrMapOvr>
-  <p:transition spd="slow">
+  <p:transition spd="slow" advTm="90000">
     <p:push dir="u"/>
   </p:transition>
 </p:sld>
@@ -12660,7 +12958,7 @@
   <p:clrMapOvr>
     <a:masterClrMapping/>
   </p:clrMapOvr>
-  <p:transition spd="slow">
+  <p:transition spd="slow" advTm="90000">
     <p:push dir="u"/>
   </p:transition>
 </p:sld>
@@ -13888,7 +14186,7 @@
   <p:clrMapOvr>
     <a:masterClrMapping/>
   </p:clrMapOvr>
-  <p:transition spd="slow">
+  <p:transition spd="slow" advTm="90000">
     <p:push dir="u"/>
   </p:transition>
 </p:sld>
@@ -15135,7 +15433,7 @@
   <p:clrMapOvr>
     <a:masterClrMapping/>
   </p:clrMapOvr>
-  <p:transition spd="slow">
+  <p:transition spd="slow" advTm="90000">
     <p:push dir="u"/>
   </p:transition>
 </p:sld>
@@ -15562,6 +15860,9 @@
   <p:clrMapOvr>
     <a:masterClrMapping/>
   </p:clrMapOvr>
+  <p:transition spd="slow" advTm="90000">
+    <p:push dir="u"/>
+  </p:transition>
 </p:sld>
 </file>
 
@@ -15963,7 +16264,7 @@
         <p:spPr>
           <a:xfrm>
             <a:off x="5370153" y="1526033"/>
-            <a:ext cx="5536397" cy="3935281"/>
+            <a:ext cx="6082041" cy="3935281"/>
           </a:xfrm>
         </p:spPr>
         <p:txBody>
@@ -15973,15 +16274,15 @@
           <a:lstStyle/>
           <a:p>
             <a:r>
-              <a:rPr lang="cs-CZ" sz="2600">
+              <a:rPr lang="cs-CZ" sz="2600" dirty="0">
                 <a:cs typeface="Calibri"/>
               </a:rPr>
-              <a:t>Vyšel v roce 2012 pro Windows Server</a:t>
-            </a:r>
-          </a:p>
-          <a:p>
-            <a:r>
-              <a:rPr lang="cs-CZ" sz="2600">
+              <a:t>Vytvořen v roce 2012 pro Windows Server</a:t>
+            </a:r>
+          </a:p>
+          <a:p>
+            <a:r>
+              <a:rPr lang="cs-CZ" sz="2600" dirty="0">
                 <a:cs typeface="Calibri"/>
               </a:rPr>
               <a:t>Podobný NTFS, ale má extra funkce pro detekci a opravu poškozených dat a zrychlení funkcí důležité pro servery</a:t>
@@ -15989,28 +16290,28 @@
           </a:p>
           <a:p>
             <a:r>
-              <a:rPr lang="cs-CZ" sz="2600">
+              <a:rPr lang="cs-CZ" sz="2600" dirty="0">
                 <a:cs typeface="Calibri"/>
               </a:rPr>
               <a:t>Chybí mu funkce, které má NTFS, např. nejde z něho spustit Windows, nemá kompresi a šifrování dat</a:t>
             </a:r>
-            <a:endParaRPr lang="cs-CZ" sz="2600"/>
-          </a:p>
-          <a:p>
-            <a:r>
-              <a:rPr lang="cs-CZ" sz="2600">
+            <a:endParaRPr lang="cs-CZ" sz="2600" dirty="0"/>
+          </a:p>
+          <a:p>
+            <a:r>
+              <a:rPr lang="cs-CZ" sz="2600" dirty="0">
                 <a:cs typeface="Calibri"/>
               </a:rPr>
               <a:t>Podporuje až 32 PB</a:t>
             </a:r>
           </a:p>
           <a:p>
-            <a:endParaRPr lang="cs-CZ" sz="2600">
+            <a:endParaRPr lang="cs-CZ" sz="2600" dirty="0">
               <a:cs typeface="Calibri"/>
             </a:endParaRPr>
           </a:p>
           <a:p>
-            <a:endParaRPr lang="cs-CZ" sz="2600">
+            <a:endParaRPr lang="cs-CZ" sz="2600" dirty="0">
               <a:cs typeface="Calibri"/>
             </a:endParaRPr>
           </a:p>
@@ -16026,6 +16327,9 @@
   <p:clrMapOvr>
     <a:masterClrMapping/>
   </p:clrMapOvr>
+  <p:transition spd="slow" advTm="90000">
+    <p:push dir="u"/>
+  </p:transition>
 </p:sld>
 </file>
 
@@ -16621,19 +16925,15 @@
               <a:rPr lang="cs-CZ" dirty="0">
                 <a:cs typeface="Calibri"/>
               </a:rPr>
-              <a:t>Taky </a:t>
-            </a:r>
-            <a:r>
-              <a:rPr lang="cs-CZ" dirty="0" err="1">
-                <a:cs typeface="Calibri"/>
-              </a:rPr>
-              <a:t>nazíván</a:t>
-            </a:r>
+              <a:t>Vytvořen v roce 1988</a:t>
+            </a:r>
+          </a:p>
+          <a:p>
             <a:r>
               <a:rPr lang="cs-CZ" dirty="0">
                 <a:cs typeface="Calibri"/>
               </a:rPr>
-              <a:t> ISO 9660</a:t>
+              <a:t>Taky nazýván ISO 9660</a:t>
             </a:r>
           </a:p>
           <a:p>
@@ -17299,6 +17599,9 @@
   <p:clrMapOvr>
     <a:masterClrMapping/>
   </p:clrMapOvr>
+  <p:transition spd="slow" advTm="90000">
+    <p:push dir="u"/>
+  </p:transition>
 </p:sld>
 </file>
 

</xml_diff>